<commit_message>
Update Kleinteile Regal präsentation.pptx
</commit_message>
<xml_diff>
--- a/Kleinteile Regal präsentation.pptx
+++ b/Kleinteile Regal präsentation.pptx
@@ -5,16 +5,15 @@
     <p:sldMasterId id="2147483648" r:id="rId1"/>
   </p:sldMasterIdLst>
   <p:notesMasterIdLst>
-    <p:notesMasterId r:id="rId9"/>
+    <p:notesMasterId r:id="rId8"/>
   </p:notesMasterIdLst>
   <p:sldIdLst>
     <p:sldId id="256" r:id="rId2"/>
     <p:sldId id="257" r:id="rId3"/>
     <p:sldId id="258" r:id="rId4"/>
     <p:sldId id="259" r:id="rId5"/>
-    <p:sldId id="260" r:id="rId6"/>
-    <p:sldId id="261" r:id="rId7"/>
-    <p:sldId id="262" r:id="rId8"/>
+    <p:sldId id="261" r:id="rId6"/>
+    <p:sldId id="262" r:id="rId7"/>
   </p:sldIdLst>
   <p:sldSz cx="12192000" cy="6858000"/>
   <p:notesSz cx="6858000" cy="9144000"/>
@@ -639,7 +638,7 @@
           <a:p>
             <a:fld id="{59DEADAC-3A4F-4E09-9D20-B2BC7FCBFF1D}" type="slidenum">
               <a:rPr lang="de-CH" smtClean="0"/>
-              <a:t>7</a:t>
+              <a:t>6</a:t>
             </a:fld>
             <a:endParaRPr lang="de-CH"/>
           </a:p>
@@ -4147,11 +4146,11 @@
           <a:p>
             <a:r>
               <a:rPr lang="de-CH" dirty="0"/>
-              <a:t>Kleinteilelager Buchungssystem für </a:t>
+              <a:t>Kleinteilelager Buchungssystem für T. </a:t>
             </a:r>
             <a:r>
               <a:rPr lang="de-CH" dirty="0" err="1"/>
-              <a:t>T.Abplanalp’s</a:t>
+              <a:t>Abplanalp’s</a:t>
             </a:r>
             <a:r>
               <a:rPr lang="de-CH" dirty="0"/>
@@ -5080,6 +5079,10 @@
           <a:bodyPr/>
           <a:lstStyle/>
           <a:p>
+            <a:r>
+              <a:rPr lang="de-CH" dirty="0"/>
+              <a:t>Tabellen als </a:t>
+            </a:r>
             <a:r>
               <a:rPr lang="de-CH" dirty="0" err="1"/>
               <a:t>Javascript</a:t>
@@ -5168,64 +5171,6 @@
           <p:cNvPr id="2" name="Titel 1">
             <a:extLst>
               <a:ext uri="{FF2B5EF4-FFF2-40B4-BE49-F238E27FC236}">
-                <a16:creationId xmlns:a16="http://schemas.microsoft.com/office/drawing/2014/main" id="{C7FEBA17-C645-DF88-BF3B-206A785D0DA6}"/>
-              </a:ext>
-            </a:extLst>
-          </p:cNvPr>
-          <p:cNvSpPr>
-            <a:spLocks noGrp="1"/>
-          </p:cNvSpPr>
-          <p:nvPr>
-            <p:ph type="title"/>
-          </p:nvPr>
-        </p:nvSpPr>
-        <p:spPr/>
-        <p:txBody>
-          <a:bodyPr/>
-          <a:lstStyle/>
-          <a:p>
-            <a:r>
-              <a:rPr lang="de-CH" dirty="0"/>
-              <a:t>Demo</a:t>
-            </a:r>
-          </a:p>
-        </p:txBody>
-      </p:sp>
-    </p:spTree>
-    <p:extLst>
-      <p:ext uri="{BB962C8B-B14F-4D97-AF65-F5344CB8AC3E}">
-        <p14:creationId xmlns:p14="http://schemas.microsoft.com/office/powerpoint/2010/main" val="403197734"/>
-      </p:ext>
-    </p:extLst>
-  </p:cSld>
-  <p:clrMapOvr>
-    <a:masterClrMapping/>
-  </p:clrMapOvr>
-</p:sld>
-</file>
-
-<file path=ppt/slides/slide6.xml><?xml version="1.0" encoding="utf-8"?>
-<p:sld xmlns:a="http://schemas.openxmlformats.org/drawingml/2006/main" xmlns:r="http://schemas.openxmlformats.org/officeDocument/2006/relationships" xmlns:p="http://schemas.openxmlformats.org/presentationml/2006/main">
-  <p:cSld>
-    <p:spTree>
-      <p:nvGrpSpPr>
-        <p:cNvPr id="1" name=""/>
-        <p:cNvGrpSpPr/>
-        <p:nvPr/>
-      </p:nvGrpSpPr>
-      <p:grpSpPr>
-        <a:xfrm>
-          <a:off x="0" y="0"/>
-          <a:ext cx="0" cy="0"/>
-          <a:chOff x="0" y="0"/>
-          <a:chExt cx="0" cy="0"/>
-        </a:xfrm>
-      </p:grpSpPr>
-      <p:sp>
-        <p:nvSpPr>
-          <p:cNvPr id="2" name="Titel 1">
-            <a:extLst>
-              <a:ext uri="{FF2B5EF4-FFF2-40B4-BE49-F238E27FC236}">
                 <a16:creationId xmlns:a16="http://schemas.microsoft.com/office/drawing/2014/main" id="{B295824C-A194-7F5D-9E2C-848481417974}"/>
               </a:ext>
             </a:extLst>
@@ -5267,7 +5212,7 @@
 </p:sld>
 </file>
 
-<file path=ppt/slides/slide7.xml><?xml version="1.0" encoding="utf-8"?>
+<file path=ppt/slides/slide6.xml><?xml version="1.0" encoding="utf-8"?>
 <p:sld xmlns:a="http://schemas.openxmlformats.org/drawingml/2006/main" xmlns:r="http://schemas.openxmlformats.org/officeDocument/2006/relationships" xmlns:p="http://schemas.openxmlformats.org/presentationml/2006/main" show="0">
   <p:cSld>
     <p:spTree>

</xml_diff>